<commit_message>
Adición de comentarios a metas y riesgos
</commit_message>
<xml_diff>
--- a/swbproys/gestor-bsc/doc/weekly/04_20130701/Junta semanal interna.pptx
+++ b/swbproys/gestor-bsc/doc/weekly/04_20130701/Junta semanal interna.pptx
@@ -5497,7 +5497,6 @@
                         <a:rPr lang="es-MX" baseline="0" dirty="0" smtClean="0"/>
                         <a:t>Propongo se me asigne este producto para continuar con el siguiente</a:t>
                       </a:r>
-                      <a:endParaRPr lang="es-MX" baseline="0" dirty="0" smtClean="0"/>
                     </a:p>
                   </a:txBody>
                   <a:tcPr/>
@@ -14356,7 +14355,7 @@
           <p:nvPr>
             <p:extLst>
               <p:ext uri="{D42A27DB-BD31-4B8C-83A1-F6EECF244321}">
-                <p14:modId xmlns:p14="http://schemas.microsoft.com/office/powerpoint/2010/main" val="1637620432"/>
+                <p14:modId xmlns:p14="http://schemas.microsoft.com/office/powerpoint/2010/main" val="1243947504"/>
               </p:ext>
             </p:extLst>
           </p:nvPr>
@@ -14662,6 +14661,10 @@
                     <a:bodyPr/>
                     <a:lstStyle/>
                     <a:p>
+                      <a:r>
+                        <a:rPr lang="es-MX" dirty="0" smtClean="0"/>
+                        <a:t>Avance del 33%</a:t>
+                      </a:r>
                       <a:endParaRPr lang="es-ES" dirty="0"/>
                     </a:p>
                   </a:txBody>
@@ -14729,6 +14732,10 @@
                     <a:bodyPr/>
                     <a:lstStyle/>
                     <a:p>
+                      <a:r>
+                        <a:rPr lang="es-MX" dirty="0" smtClean="0"/>
+                        <a:t>En progreso</a:t>
+                      </a:r>
                       <a:endParaRPr lang="es-ES" dirty="0"/>
                     </a:p>
                   </a:txBody>
@@ -14873,7 +14880,7 @@
           <p:nvPr>
             <p:extLst>
               <p:ext uri="{D42A27DB-BD31-4B8C-83A1-F6EECF244321}">
-                <p14:modId xmlns:p14="http://schemas.microsoft.com/office/powerpoint/2010/main" val="3857721293"/>
+                <p14:modId xmlns:p14="http://schemas.microsoft.com/office/powerpoint/2010/main" val="1475534186"/>
               </p:ext>
             </p:extLst>
           </p:nvPr>
@@ -15271,6 +15278,18 @@
                     <a:bodyPr/>
                     <a:lstStyle/>
                     <a:p>
+                      <a:r>
+                        <a:rPr lang="es-MX" dirty="0" smtClean="0"/>
+                        <a:t>A la fecha no </a:t>
+                      </a:r>
+                      <a:r>
+                        <a:rPr lang="es-MX" smtClean="0"/>
+                        <a:t>es</a:t>
+                      </a:r>
+                      <a:r>
+                        <a:rPr lang="es-MX" baseline="0" smtClean="0"/>
+                        <a:t> medible</a:t>
+                      </a:r>
                       <a:endParaRPr lang="es-ES" dirty="0"/>
                     </a:p>
                   </a:txBody>

</xml_diff>